<commit_message>
Add the MetaRule Exceptions.
Change-Id: I1d34246da04b0cdd53b8e85fb8ca112a23dc7ed8
</commit_message>
<xml_diff>
--- a/keystone-moon/doc/source/extensions/moon/ExceptionHierarchy.pptx
+++ b/keystone-moon/doc/source/extensions/moon/ExceptionHierarchy.pptx
@@ -1425,7 +1425,7 @@
           <a:bodyPr lIns="0" rIns="0" tIns="0" bIns="0"/>
           <a:p>
             <a:pPr algn="r"/>
-            <a:fld id="{148B587A-E8C3-4013-8832-95A0AD4F7829}" type="slidenum">
+            <a:fld id="{EA3F2D50-6F0F-4214-9C87-760622D90E27}" type="slidenum">
               <a:rPr lang="en-GB" sz="1400">
                 <a:latin typeface="Times New Roman"/>
               </a:rPr>
@@ -1603,15 +1603,18 @@
       <p:cxnSp>
         <p:nvCxnSpPr>
           <p:cNvPr id="43" name="Line 5"/>
-          <p:cNvCxnSpPr/>
+          <p:cNvCxnSpPr>
+            <a:stCxn id="39" idx="2"/>
+            <a:endCxn id="40" idx="1"/>
+          </p:cNvCxnSpPr>
           <p:nvPr/>
         </p:nvCxnSpPr>
         <p:spPr>
           <a:xfrm>
-            <a:off x="0" y="0"/>
-            <a:ext cx="360" cy="360"/>
-          </a:xfrm>
-          <a:prstGeom prst="line">
+            <a:off x="772920" y="1714320"/>
+            <a:ext cx="199440" cy="475200"/>
+          </a:xfrm>
+          <a:prstGeom prst="bentConnector3">
             <a:avLst/>
           </a:prstGeom>
           <a:ln>
@@ -1624,15 +1627,18 @@
       <p:cxnSp>
         <p:nvCxnSpPr>
           <p:cNvPr id="44" name="Line 6"/>
-          <p:cNvCxnSpPr/>
+          <p:cNvCxnSpPr>
+            <a:stCxn id="39" idx="2"/>
+            <a:endCxn id="41" idx="1"/>
+          </p:cNvCxnSpPr>
           <p:nvPr/>
         </p:nvCxnSpPr>
         <p:spPr>
           <a:xfrm>
-            <a:off x="0" y="0"/>
-            <a:ext cx="360" cy="360"/>
-          </a:xfrm>
-          <a:prstGeom prst="line">
+            <a:off x="772920" y="1714320"/>
+            <a:ext cx="199440" cy="2288880"/>
+          </a:xfrm>
+          <a:prstGeom prst="bentConnector3">
             <a:avLst/>
           </a:prstGeom>
           <a:ln>
@@ -1645,15 +1651,18 @@
       <p:cxnSp>
         <p:nvCxnSpPr>
           <p:cNvPr id="45" name="Line 7"/>
-          <p:cNvCxnSpPr/>
+          <p:cNvCxnSpPr>
+            <a:stCxn id="39" idx="2"/>
+            <a:endCxn id="42" idx="1"/>
+          </p:cNvCxnSpPr>
           <p:nvPr/>
         </p:nvCxnSpPr>
         <p:spPr>
           <a:xfrm>
-            <a:off x="0" y="0"/>
-            <a:ext cx="360" cy="360"/>
-          </a:xfrm>
-          <a:prstGeom prst="line">
+            <a:off x="772920" y="1714320"/>
+            <a:ext cx="199440" cy="3571200"/>
+          </a:xfrm>
+          <a:prstGeom prst="bentConnector3">
             <a:avLst/>
           </a:prstGeom>
           <a:ln>
@@ -1768,15 +1777,18 @@
       <p:cxnSp>
         <p:nvCxnSpPr>
           <p:cNvPr id="49" name="Line 11"/>
-          <p:cNvCxnSpPr/>
+          <p:cNvCxnSpPr>
+            <a:stCxn id="39" idx="2"/>
+            <a:endCxn id="48" idx="1"/>
+          </p:cNvCxnSpPr>
           <p:nvPr/>
         </p:nvCxnSpPr>
         <p:spPr>
           <a:xfrm>
-            <a:off x="0" y="0"/>
-            <a:ext cx="360" cy="360"/>
-          </a:xfrm>
-          <a:prstGeom prst="line">
+            <a:off x="772920" y="1714320"/>
+            <a:ext cx="199440" cy="884880"/>
+          </a:xfrm>
+          <a:prstGeom prst="bentConnector3">
             <a:avLst/>
           </a:prstGeom>
           <a:ln>
@@ -1964,7 +1976,7 @@
         <p:spPr>
           <a:xfrm>
             <a:off x="3284640" y="3944520"/>
-            <a:ext cx="1107360" cy="346320"/>
+            <a:ext cx="1113480" cy="346320"/>
           </a:xfrm>
           <a:prstGeom prst="rect">
             <a:avLst/>
@@ -2011,12 +2023,18 @@
           <a:p>
             <a:r>
               <a:rPr lang="en-GB" sz="1200">
+                <a:solidFill>
+                  <a:srgbClr val="ff3333"/>
+                </a:solidFill>
                 <a:latin typeface="Courier New"/>
               </a:rPr>
               <a:t>Item</a:t>
             </a:r>
             <a:r>
               <a:rPr lang="en-GB" sz="1200">
+                <a:solidFill>
+                  <a:srgbClr val="ff3333"/>
+                </a:solidFill>
                 <a:latin typeface="Arial"/>
               </a:rPr>
               <a:t>Unknown</a:t>
@@ -2093,12 +2111,18 @@
           <a:p>
             <a:r>
               <a:rPr lang="en-GB" sz="1200">
+                <a:solidFill>
+                  <a:srgbClr val="ff3333"/>
+                </a:solidFill>
                 <a:latin typeface="Courier New"/>
               </a:rPr>
               <a:t>Item</a:t>
             </a:r>
             <a:r>
               <a:rPr lang="en-GB" sz="1200">
+                <a:solidFill>
+                  <a:srgbClr val="ff3333"/>
+                </a:solidFill>
                 <a:latin typeface="Arial"/>
               </a:rPr>
               <a:t>CategoryAssignmentUnknown</a:t>
@@ -2233,6 +2257,9 @@
           <a:p>
             <a:r>
               <a:rPr lang="en-GB" sz="1200">
+                <a:solidFill>
+                  <a:srgbClr val="ff3333"/>
+                </a:solidFill>
                 <a:latin typeface="Arial"/>
               </a:rPr>
               <a:t>RuleUnknown</a:t>
@@ -2300,8 +2327,8 @@
         </p:nvCxnSpPr>
         <p:spPr>
           <a:xfrm flipV="1">
-            <a:off x="4392000" y="3634560"/>
-            <a:ext cx="2160360" cy="483480"/>
+            <a:off x="4398120" y="3634560"/>
+            <a:ext cx="2154240" cy="483480"/>
           </a:xfrm>
           <a:prstGeom prst="straightConnector1">
             <a:avLst/>
@@ -2625,12 +2652,18 @@
           <a:p>
             <a:r>
               <a:rPr lang="en-GB" sz="1200">
+                <a:solidFill>
+                  <a:srgbClr val="006600"/>
+                </a:solidFill>
                 <a:latin typeface="Courier New"/>
               </a:rPr>
               <a:t>ItemRequest</a:t>
             </a:r>
             <a:r>
               <a:rPr lang="en-GB" sz="1200">
+                <a:solidFill>
+                  <a:srgbClr val="006600"/>
+                </a:solidFill>
                 <a:latin typeface="Arial"/>
               </a:rPr>
               <a:t>NotAuthorized</a:t>
@@ -2795,7 +2828,7 @@
         <p:spPr>
           <a:xfrm>
             <a:off x="612000" y="6408000"/>
-            <a:ext cx="3807720" cy="1096560"/>
+            <a:ext cx="3807720" cy="1110960"/>
           </a:xfrm>
           <a:prstGeom prst="rect">
             <a:avLst/>
@@ -2810,12 +2843,18 @@
           <a:p>
             <a:r>
               <a:rPr b="1" i="1" lang="en-GB" sz="1400">
+                <a:solidFill>
+                  <a:srgbClr val="808080"/>
+                </a:solidFill>
                 <a:latin typeface="Courier New"/>
               </a:rPr>
               <a:t>Item</a:t>
             </a:r>
             <a:r>
               <a:rPr i="1" lang="en-GB" sz="1400">
+                <a:solidFill>
+                  <a:srgbClr val="808080"/>
+                </a:solidFill>
                 <a:latin typeface="Courier New"/>
               </a:rPr>
               <a:t> are {Subject, Object, Action}</a:t>
@@ -2825,12 +2864,18 @@
           <a:p>
             <a:r>
               <a:rPr b="1" i="1" lang="en-GB" sz="1400">
+                <a:solidFill>
+                  <a:srgbClr val="808080"/>
+                </a:solidFill>
                 <a:latin typeface="Courier New"/>
               </a:rPr>
               <a:t>Request</a:t>
             </a:r>
             <a:r>
               <a:rPr i="1" lang="en-GB" sz="1400">
+                <a:solidFill>
+                  <a:srgbClr val="808080"/>
+                </a:solidFill>
                 <a:latin typeface="Courier New"/>
               </a:rPr>
               <a:t> are {Read, Add, Del}</a:t>
@@ -2849,6 +2894,9 @@
             </a:r>
             <a:r>
               <a:rPr i="1" lang="en-GB" sz="1400">
+                <a:solidFill>
+                  <a:srgbClr val="808080"/>
+                </a:solidFill>
                 <a:latin typeface="Courier New"/>
               </a:rPr>
               <a:t> exceptions</a:t>
@@ -2867,6 +2915,9 @@
             </a:r>
             <a:r>
               <a:rPr i="1" lang="en-GB" sz="1400">
+                <a:solidFill>
+                  <a:srgbClr val="808080"/>
+                </a:solidFill>
                 <a:latin typeface="Courier New"/>
               </a:rPr>
               <a:t> exceptions</a:t>
@@ -2885,6 +2936,9 @@
             </a:r>
             <a:r>
               <a:rPr i="1" lang="en-GB" sz="1400">
+                <a:solidFill>
+                  <a:srgbClr val="808080"/>
+                </a:solidFill>
                 <a:latin typeface="Courier New"/>
               </a:rPr>
               <a:t> exceptions</a:t>
@@ -2940,24 +2994,36 @@
           <a:p>
             <a:r>
               <a:rPr lang="en-GB" sz="1200">
+                <a:solidFill>
+                  <a:srgbClr val="006600"/>
+                </a:solidFill>
                 <a:latin typeface="Courier New"/>
               </a:rPr>
               <a:t>Item</a:t>
             </a:r>
             <a:r>
               <a:rPr lang="en-GB" sz="1200">
+                <a:solidFill>
+                  <a:srgbClr val="006600"/>
+                </a:solidFill>
                 <a:latin typeface="Arial"/>
               </a:rPr>
               <a:t>CategoryScope</a:t>
             </a:r>
             <a:r>
               <a:rPr lang="en-GB" sz="1200">
+                <a:solidFill>
+                  <a:srgbClr val="006600"/>
+                </a:solidFill>
                 <a:latin typeface="Courier New"/>
               </a:rPr>
               <a:t>Request</a:t>
             </a:r>
             <a:r>
               <a:rPr lang="en-GB" sz="1200">
+                <a:solidFill>
+                  <a:srgbClr val="006600"/>
+                </a:solidFill>
                 <a:latin typeface="Arial"/>
               </a:rPr>
               <a:t>NotAuthorized</a:t>
@@ -3013,24 +3079,36 @@
           <a:p>
             <a:r>
               <a:rPr lang="en-GB" sz="1200">
+                <a:solidFill>
+                  <a:srgbClr val="006600"/>
+                </a:solidFill>
                 <a:latin typeface="Courier New"/>
               </a:rPr>
               <a:t>Item</a:t>
             </a:r>
             <a:r>
               <a:rPr lang="en-GB" sz="1200">
+                <a:solidFill>
+                  <a:srgbClr val="006600"/>
+                </a:solidFill>
                 <a:latin typeface="Arial"/>
               </a:rPr>
               <a:t>Category</a:t>
             </a:r>
             <a:r>
               <a:rPr lang="en-GB" sz="1200">
+                <a:solidFill>
+                  <a:srgbClr val="006600"/>
+                </a:solidFill>
                 <a:latin typeface="Courier New"/>
               </a:rPr>
               <a:t>Request</a:t>
             </a:r>
             <a:r>
               <a:rPr lang="en-GB" sz="1200">
+                <a:solidFill>
+                  <a:srgbClr val="006600"/>
+                </a:solidFill>
                 <a:latin typeface="Arial"/>
               </a:rPr>
               <a:t>NotAuthorized</a:t>
@@ -3086,24 +3164,36 @@
           <a:p>
             <a:r>
               <a:rPr lang="en-GB" sz="1200">
+                <a:solidFill>
+                  <a:srgbClr val="006600"/>
+                </a:solidFill>
                 <a:latin typeface="Courier New"/>
               </a:rPr>
               <a:t>Item</a:t>
             </a:r>
             <a:r>
               <a:rPr lang="en-GB" sz="1200">
+                <a:solidFill>
+                  <a:srgbClr val="006600"/>
+                </a:solidFill>
                 <a:latin typeface="Arial"/>
               </a:rPr>
               <a:t>CategoryAssignment</a:t>
             </a:r>
             <a:r>
               <a:rPr lang="en-GB" sz="1200">
+                <a:solidFill>
+                  <a:srgbClr val="006600"/>
+                </a:solidFill>
                 <a:latin typeface="Courier New"/>
               </a:rPr>
               <a:t>Request</a:t>
             </a:r>
             <a:r>
               <a:rPr lang="en-GB" sz="1200">
+                <a:solidFill>
+                  <a:srgbClr val="006600"/>
+                </a:solidFill>
                 <a:latin typeface="Arial"/>
               </a:rPr>
               <a:t>NotAuthorized</a:t>
@@ -3122,8 +3212,8 @@
         </p:nvCxnSpPr>
         <p:spPr>
           <a:xfrm>
-            <a:off x="4464000" y="5737680"/>
-            <a:ext cx="1656360" cy="167760"/>
+            <a:off x="4470120" y="5737680"/>
+            <a:ext cx="1650240" cy="167760"/>
           </a:xfrm>
           <a:prstGeom prst="straightConnector1">
             <a:avLst/>
@@ -3159,18 +3249,27 @@
           <a:p>
             <a:r>
               <a:rPr lang="en-GB" sz="1200">
+                <a:solidFill>
+                  <a:srgbClr val="006600"/>
+                </a:solidFill>
                 <a:latin typeface="Arial"/>
               </a:rPr>
               <a:t>Rule</a:t>
             </a:r>
             <a:r>
               <a:rPr lang="en-GB" sz="1200">
+                <a:solidFill>
+                  <a:srgbClr val="006600"/>
+                </a:solidFill>
                 <a:latin typeface="Courier New"/>
               </a:rPr>
               <a:t>Request</a:t>
             </a:r>
             <a:r>
               <a:rPr lang="en-GB" sz="1200">
+                <a:solidFill>
+                  <a:srgbClr val="006600"/>
+                </a:solidFill>
                 <a:latin typeface="Arial"/>
               </a:rPr>
               <a:t>NotAuthorized</a:t>
@@ -3243,7 +3342,7 @@
         <p:spPr>
           <a:xfrm>
             <a:off x="216360" y="6192360"/>
-            <a:ext cx="1034280" cy="291600"/>
+            <a:ext cx="1034280" cy="294480"/>
           </a:xfrm>
           <a:prstGeom prst="rect">
             <a:avLst/>
@@ -3258,6 +3357,9 @@
           <a:p>
             <a:r>
               <a:rPr b="1" i="1" lang="en-GB" sz="1400">
+                <a:solidFill>
+                  <a:srgbClr val="808080"/>
+                </a:solidFill>
                 <a:latin typeface="Courier New"/>
               </a:rPr>
               <a:t>Legend: </a:t>
@@ -3339,7 +3441,7 @@
         <p:spPr>
           <a:xfrm>
             <a:off x="3356640" y="5564520"/>
-            <a:ext cx="1107360" cy="346320"/>
+            <a:ext cx="1113480" cy="346320"/>
           </a:xfrm>
           <a:prstGeom prst="rect">
             <a:avLst/>
@@ -3426,35 +3528,140 @@
           </a:p>
         </p:txBody>
       </p:sp>
+      <p:sp>
+        <p:nvSpPr>
+          <p:cNvPr id="102" name="TextShape 64"/>
+          <p:cNvSpPr txBox="1"/>
+          <p:nvPr/>
+        </p:nvSpPr>
+        <p:spPr>
+          <a:xfrm>
+            <a:off x="6120000" y="6264360"/>
+            <a:ext cx="3384000" cy="290160"/>
+          </a:xfrm>
+          <a:prstGeom prst="rect">
+            <a:avLst/>
+          </a:prstGeom>
+          <a:noFill/>
+          <a:ln>
+            <a:noFill/>
+          </a:ln>
+        </p:spPr>
+        <p:txBody>
+          <a:bodyPr lIns="90000" rIns="90000" tIns="45000" bIns="45000"/>
+          <a:p>
+            <a:r>
+              <a:rPr lang="en-GB" sz="1200">
+                <a:solidFill>
+                  <a:srgbClr val="006600"/>
+                </a:solidFill>
+                <a:latin typeface="Arial"/>
+              </a:rPr>
+              <a:t>MetaRule</a:t>
+            </a:r>
+            <a:r>
+              <a:rPr lang="en-GB" sz="1200">
+                <a:solidFill>
+                  <a:srgbClr val="006600"/>
+                </a:solidFill>
+                <a:latin typeface="Courier New"/>
+              </a:rPr>
+              <a:t>Request</a:t>
+            </a:r>
+            <a:r>
+              <a:rPr lang="en-GB" sz="1200">
+                <a:solidFill>
+                  <a:srgbClr val="006600"/>
+                </a:solidFill>
+                <a:latin typeface="Arial"/>
+              </a:rPr>
+              <a:t>NotAuthorized</a:t>
+            </a:r>
+            <a:endParaRPr/>
+          </a:p>
+        </p:txBody>
+      </p:sp>
+      <p:cxnSp>
+        <p:nvCxnSpPr>
+          <p:cNvPr id="103" name="Line 65"/>
+          <p:cNvCxnSpPr>
+            <a:endCxn id="102" idx="1"/>
+          </p:cNvCxnSpPr>
+          <p:nvPr/>
+        </p:nvCxnSpPr>
+        <p:spPr>
+          <a:xfrm>
+            <a:off x="4464000" y="6228360"/>
+            <a:ext cx="1656360" cy="181440"/>
+          </a:xfrm>
+          <a:prstGeom prst="straightConnector1">
+            <a:avLst/>
+          </a:prstGeom>
+          <a:ln>
+            <a:solidFill>
+              <a:srgbClr val="000000"/>
+            </a:solidFill>
+          </a:ln>
+        </p:spPr>
+      </p:cxnSp>
+      <p:sp>
+        <p:nvSpPr>
+          <p:cNvPr id="104" name="TextShape 66"/>
+          <p:cNvSpPr txBox="1"/>
+          <p:nvPr/>
+        </p:nvSpPr>
+        <p:spPr>
+          <a:xfrm>
+            <a:off x="3356640" y="6055200"/>
+            <a:ext cx="1107360" cy="346320"/>
+          </a:xfrm>
+          <a:prstGeom prst="rect">
+            <a:avLst/>
+          </a:prstGeom>
+          <a:noFill/>
+          <a:ln>
+            <a:noFill/>
+          </a:ln>
+        </p:spPr>
+        <p:txBody>
+          <a:bodyPr lIns="90000" rIns="90000" tIns="45000" bIns="45000"/>
+          <a:p>
+            <a:r>
+              <a:rPr lang="en-GB" sz="1400">
+                <a:latin typeface="Arial"/>
+              </a:rPr>
+              <a:t>MetaRule</a:t>
+            </a:r>
+            <a:endParaRPr/>
+          </a:p>
+        </p:txBody>
+      </p:sp>
+      <p:cxnSp>
+        <p:nvCxnSpPr>
+          <p:cNvPr id="105" name="Line 67"/>
+          <p:cNvCxnSpPr>
+            <a:stCxn id="42" idx="3"/>
+            <a:endCxn id="104" idx="1"/>
+          </p:cNvCxnSpPr>
+          <p:nvPr/>
+        </p:nvCxnSpPr>
+        <p:spPr>
+          <a:xfrm>
+            <a:off x="2800080" y="5285160"/>
+            <a:ext cx="556920" cy="943560"/>
+          </a:xfrm>
+          <a:prstGeom prst="straightConnector1">
+            <a:avLst/>
+          </a:prstGeom>
+          <a:ln>
+            <a:solidFill>
+              <a:srgbClr val="000000"/>
+            </a:solidFill>
+          </a:ln>
+        </p:spPr>
+      </p:cxnSp>
     </p:spTree>
   </p:cSld>
-  <p:timing>
-    <p:tnLst>
-      <p:par>
-        <p:cTn id="1" dur="indefinite" restart="never" nodeType="tmRoot">
-          <p:childTnLst>
-            <p:seq>
-              <p:cTn id="2" nodeType="mainSeq"/>
-              <p:prevCondLst>
-                <p:cond delay="0" evt="onPrev">
-                  <p:tgtEl>
-                    <p:sldTgt/>
-                  </p:tgtEl>
-                </p:cond>
-              </p:prevCondLst>
-              <p:nextCondLst>
-                <p:cond delay="0" evt="onNext">
-                  <p:tgtEl>
-                    <p:sldTgt/>
-                  </p:tgtEl>
-                </p:cond>
-              </p:nextCondLst>
-            </p:seq>
-          </p:childTnLst>
-        </p:cTn>
-      </p:par>
-    </p:tnLst>
-  </p:timing>
 </p:sld>
 </file>
 

</xml_diff>

<commit_message>
Add tests for Authz exceptions.
Change-Id: Ib7d438148a4c45c79f541a370c0eee9a4519fecd

Add the MetaRule Exceptions.

Change-Id: I1d34246da04b0cdd53b8e85fb8ca112a23dc7ed8
</commit_message>
<xml_diff>
--- a/keystone-moon/doc/source/extensions/moon/ExceptionHierarchy.pptx
+++ b/keystone-moon/doc/source/extensions/moon/ExceptionHierarchy.pptx
@@ -1425,7 +1425,7 @@
           <a:bodyPr lIns="0" rIns="0" tIns="0" bIns="0"/>
           <a:p>
             <a:pPr algn="r"/>
-            <a:fld id="{148B587A-E8C3-4013-8832-95A0AD4F7829}" type="slidenum">
+            <a:fld id="{EA3F2D50-6F0F-4214-9C87-760622D90E27}" type="slidenum">
               <a:rPr lang="en-GB" sz="1400">
                 <a:latin typeface="Times New Roman"/>
               </a:rPr>
@@ -1603,15 +1603,18 @@
       <p:cxnSp>
         <p:nvCxnSpPr>
           <p:cNvPr id="43" name="Line 5"/>
-          <p:cNvCxnSpPr/>
+          <p:cNvCxnSpPr>
+            <a:stCxn id="39" idx="2"/>
+            <a:endCxn id="40" idx="1"/>
+          </p:cNvCxnSpPr>
           <p:nvPr/>
         </p:nvCxnSpPr>
         <p:spPr>
           <a:xfrm>
-            <a:off x="0" y="0"/>
-            <a:ext cx="360" cy="360"/>
-          </a:xfrm>
-          <a:prstGeom prst="line">
+            <a:off x="772920" y="1714320"/>
+            <a:ext cx="199440" cy="475200"/>
+          </a:xfrm>
+          <a:prstGeom prst="bentConnector3">
             <a:avLst/>
           </a:prstGeom>
           <a:ln>
@@ -1624,15 +1627,18 @@
       <p:cxnSp>
         <p:nvCxnSpPr>
           <p:cNvPr id="44" name="Line 6"/>
-          <p:cNvCxnSpPr/>
+          <p:cNvCxnSpPr>
+            <a:stCxn id="39" idx="2"/>
+            <a:endCxn id="41" idx="1"/>
+          </p:cNvCxnSpPr>
           <p:nvPr/>
         </p:nvCxnSpPr>
         <p:spPr>
           <a:xfrm>
-            <a:off x="0" y="0"/>
-            <a:ext cx="360" cy="360"/>
-          </a:xfrm>
-          <a:prstGeom prst="line">
+            <a:off x="772920" y="1714320"/>
+            <a:ext cx="199440" cy="2288880"/>
+          </a:xfrm>
+          <a:prstGeom prst="bentConnector3">
             <a:avLst/>
           </a:prstGeom>
           <a:ln>
@@ -1645,15 +1651,18 @@
       <p:cxnSp>
         <p:nvCxnSpPr>
           <p:cNvPr id="45" name="Line 7"/>
-          <p:cNvCxnSpPr/>
+          <p:cNvCxnSpPr>
+            <a:stCxn id="39" idx="2"/>
+            <a:endCxn id="42" idx="1"/>
+          </p:cNvCxnSpPr>
           <p:nvPr/>
         </p:nvCxnSpPr>
         <p:spPr>
           <a:xfrm>
-            <a:off x="0" y="0"/>
-            <a:ext cx="360" cy="360"/>
-          </a:xfrm>
-          <a:prstGeom prst="line">
+            <a:off x="772920" y="1714320"/>
+            <a:ext cx="199440" cy="3571200"/>
+          </a:xfrm>
+          <a:prstGeom prst="bentConnector3">
             <a:avLst/>
           </a:prstGeom>
           <a:ln>
@@ -1768,15 +1777,18 @@
       <p:cxnSp>
         <p:nvCxnSpPr>
           <p:cNvPr id="49" name="Line 11"/>
-          <p:cNvCxnSpPr/>
+          <p:cNvCxnSpPr>
+            <a:stCxn id="39" idx="2"/>
+            <a:endCxn id="48" idx="1"/>
+          </p:cNvCxnSpPr>
           <p:nvPr/>
         </p:nvCxnSpPr>
         <p:spPr>
           <a:xfrm>
-            <a:off x="0" y="0"/>
-            <a:ext cx="360" cy="360"/>
-          </a:xfrm>
-          <a:prstGeom prst="line">
+            <a:off x="772920" y="1714320"/>
+            <a:ext cx="199440" cy="884880"/>
+          </a:xfrm>
+          <a:prstGeom prst="bentConnector3">
             <a:avLst/>
           </a:prstGeom>
           <a:ln>
@@ -1964,7 +1976,7 @@
         <p:spPr>
           <a:xfrm>
             <a:off x="3284640" y="3944520"/>
-            <a:ext cx="1107360" cy="346320"/>
+            <a:ext cx="1113480" cy="346320"/>
           </a:xfrm>
           <a:prstGeom prst="rect">
             <a:avLst/>
@@ -2011,12 +2023,18 @@
           <a:p>
             <a:r>
               <a:rPr lang="en-GB" sz="1200">
+                <a:solidFill>
+                  <a:srgbClr val="ff3333"/>
+                </a:solidFill>
                 <a:latin typeface="Courier New"/>
               </a:rPr>
               <a:t>Item</a:t>
             </a:r>
             <a:r>
               <a:rPr lang="en-GB" sz="1200">
+                <a:solidFill>
+                  <a:srgbClr val="ff3333"/>
+                </a:solidFill>
                 <a:latin typeface="Arial"/>
               </a:rPr>
               <a:t>Unknown</a:t>
@@ -2093,12 +2111,18 @@
           <a:p>
             <a:r>
               <a:rPr lang="en-GB" sz="1200">
+                <a:solidFill>
+                  <a:srgbClr val="ff3333"/>
+                </a:solidFill>
                 <a:latin typeface="Courier New"/>
               </a:rPr>
               <a:t>Item</a:t>
             </a:r>
             <a:r>
               <a:rPr lang="en-GB" sz="1200">
+                <a:solidFill>
+                  <a:srgbClr val="ff3333"/>
+                </a:solidFill>
                 <a:latin typeface="Arial"/>
               </a:rPr>
               <a:t>CategoryAssignmentUnknown</a:t>
@@ -2233,6 +2257,9 @@
           <a:p>
             <a:r>
               <a:rPr lang="en-GB" sz="1200">
+                <a:solidFill>
+                  <a:srgbClr val="ff3333"/>
+                </a:solidFill>
                 <a:latin typeface="Arial"/>
               </a:rPr>
               <a:t>RuleUnknown</a:t>
@@ -2300,8 +2327,8 @@
         </p:nvCxnSpPr>
         <p:spPr>
           <a:xfrm flipV="1">
-            <a:off x="4392000" y="3634560"/>
-            <a:ext cx="2160360" cy="483480"/>
+            <a:off x="4398120" y="3634560"/>
+            <a:ext cx="2154240" cy="483480"/>
           </a:xfrm>
           <a:prstGeom prst="straightConnector1">
             <a:avLst/>
@@ -2625,12 +2652,18 @@
           <a:p>
             <a:r>
               <a:rPr lang="en-GB" sz="1200">
+                <a:solidFill>
+                  <a:srgbClr val="006600"/>
+                </a:solidFill>
                 <a:latin typeface="Courier New"/>
               </a:rPr>
               <a:t>ItemRequest</a:t>
             </a:r>
             <a:r>
               <a:rPr lang="en-GB" sz="1200">
+                <a:solidFill>
+                  <a:srgbClr val="006600"/>
+                </a:solidFill>
                 <a:latin typeface="Arial"/>
               </a:rPr>
               <a:t>NotAuthorized</a:t>
@@ -2795,7 +2828,7 @@
         <p:spPr>
           <a:xfrm>
             <a:off x="612000" y="6408000"/>
-            <a:ext cx="3807720" cy="1096560"/>
+            <a:ext cx="3807720" cy="1110960"/>
           </a:xfrm>
           <a:prstGeom prst="rect">
             <a:avLst/>
@@ -2810,12 +2843,18 @@
           <a:p>
             <a:r>
               <a:rPr b="1" i="1" lang="en-GB" sz="1400">
+                <a:solidFill>
+                  <a:srgbClr val="808080"/>
+                </a:solidFill>
                 <a:latin typeface="Courier New"/>
               </a:rPr>
               <a:t>Item</a:t>
             </a:r>
             <a:r>
               <a:rPr i="1" lang="en-GB" sz="1400">
+                <a:solidFill>
+                  <a:srgbClr val="808080"/>
+                </a:solidFill>
                 <a:latin typeface="Courier New"/>
               </a:rPr>
               <a:t> are {Subject, Object, Action}</a:t>
@@ -2825,12 +2864,18 @@
           <a:p>
             <a:r>
               <a:rPr b="1" i="1" lang="en-GB" sz="1400">
+                <a:solidFill>
+                  <a:srgbClr val="808080"/>
+                </a:solidFill>
                 <a:latin typeface="Courier New"/>
               </a:rPr>
               <a:t>Request</a:t>
             </a:r>
             <a:r>
               <a:rPr i="1" lang="en-GB" sz="1400">
+                <a:solidFill>
+                  <a:srgbClr val="808080"/>
+                </a:solidFill>
                 <a:latin typeface="Courier New"/>
               </a:rPr>
               <a:t> are {Read, Add, Del}</a:t>
@@ -2849,6 +2894,9 @@
             </a:r>
             <a:r>
               <a:rPr i="1" lang="en-GB" sz="1400">
+                <a:solidFill>
+                  <a:srgbClr val="808080"/>
+                </a:solidFill>
                 <a:latin typeface="Courier New"/>
               </a:rPr>
               <a:t> exceptions</a:t>
@@ -2867,6 +2915,9 @@
             </a:r>
             <a:r>
               <a:rPr i="1" lang="en-GB" sz="1400">
+                <a:solidFill>
+                  <a:srgbClr val="808080"/>
+                </a:solidFill>
                 <a:latin typeface="Courier New"/>
               </a:rPr>
               <a:t> exceptions</a:t>
@@ -2885,6 +2936,9 @@
             </a:r>
             <a:r>
               <a:rPr i="1" lang="en-GB" sz="1400">
+                <a:solidFill>
+                  <a:srgbClr val="808080"/>
+                </a:solidFill>
                 <a:latin typeface="Courier New"/>
               </a:rPr>
               <a:t> exceptions</a:t>
@@ -2940,24 +2994,36 @@
           <a:p>
             <a:r>
               <a:rPr lang="en-GB" sz="1200">
+                <a:solidFill>
+                  <a:srgbClr val="006600"/>
+                </a:solidFill>
                 <a:latin typeface="Courier New"/>
               </a:rPr>
               <a:t>Item</a:t>
             </a:r>
             <a:r>
               <a:rPr lang="en-GB" sz="1200">
+                <a:solidFill>
+                  <a:srgbClr val="006600"/>
+                </a:solidFill>
                 <a:latin typeface="Arial"/>
               </a:rPr>
               <a:t>CategoryScope</a:t>
             </a:r>
             <a:r>
               <a:rPr lang="en-GB" sz="1200">
+                <a:solidFill>
+                  <a:srgbClr val="006600"/>
+                </a:solidFill>
                 <a:latin typeface="Courier New"/>
               </a:rPr>
               <a:t>Request</a:t>
             </a:r>
             <a:r>
               <a:rPr lang="en-GB" sz="1200">
+                <a:solidFill>
+                  <a:srgbClr val="006600"/>
+                </a:solidFill>
                 <a:latin typeface="Arial"/>
               </a:rPr>
               <a:t>NotAuthorized</a:t>
@@ -3013,24 +3079,36 @@
           <a:p>
             <a:r>
               <a:rPr lang="en-GB" sz="1200">
+                <a:solidFill>
+                  <a:srgbClr val="006600"/>
+                </a:solidFill>
                 <a:latin typeface="Courier New"/>
               </a:rPr>
               <a:t>Item</a:t>
             </a:r>
             <a:r>
               <a:rPr lang="en-GB" sz="1200">
+                <a:solidFill>
+                  <a:srgbClr val="006600"/>
+                </a:solidFill>
                 <a:latin typeface="Arial"/>
               </a:rPr>
               <a:t>Category</a:t>
             </a:r>
             <a:r>
               <a:rPr lang="en-GB" sz="1200">
+                <a:solidFill>
+                  <a:srgbClr val="006600"/>
+                </a:solidFill>
                 <a:latin typeface="Courier New"/>
               </a:rPr>
               <a:t>Request</a:t>
             </a:r>
             <a:r>
               <a:rPr lang="en-GB" sz="1200">
+                <a:solidFill>
+                  <a:srgbClr val="006600"/>
+                </a:solidFill>
                 <a:latin typeface="Arial"/>
               </a:rPr>
               <a:t>NotAuthorized</a:t>
@@ -3086,24 +3164,36 @@
           <a:p>
             <a:r>
               <a:rPr lang="en-GB" sz="1200">
+                <a:solidFill>
+                  <a:srgbClr val="006600"/>
+                </a:solidFill>
                 <a:latin typeface="Courier New"/>
               </a:rPr>
               <a:t>Item</a:t>
             </a:r>
             <a:r>
               <a:rPr lang="en-GB" sz="1200">
+                <a:solidFill>
+                  <a:srgbClr val="006600"/>
+                </a:solidFill>
                 <a:latin typeface="Arial"/>
               </a:rPr>
               <a:t>CategoryAssignment</a:t>
             </a:r>
             <a:r>
               <a:rPr lang="en-GB" sz="1200">
+                <a:solidFill>
+                  <a:srgbClr val="006600"/>
+                </a:solidFill>
                 <a:latin typeface="Courier New"/>
               </a:rPr>
               <a:t>Request</a:t>
             </a:r>
             <a:r>
               <a:rPr lang="en-GB" sz="1200">
+                <a:solidFill>
+                  <a:srgbClr val="006600"/>
+                </a:solidFill>
                 <a:latin typeface="Arial"/>
               </a:rPr>
               <a:t>NotAuthorized</a:t>
@@ -3122,8 +3212,8 @@
         </p:nvCxnSpPr>
         <p:spPr>
           <a:xfrm>
-            <a:off x="4464000" y="5737680"/>
-            <a:ext cx="1656360" cy="167760"/>
+            <a:off x="4470120" y="5737680"/>
+            <a:ext cx="1650240" cy="167760"/>
           </a:xfrm>
           <a:prstGeom prst="straightConnector1">
             <a:avLst/>
@@ -3159,18 +3249,27 @@
           <a:p>
             <a:r>
               <a:rPr lang="en-GB" sz="1200">
+                <a:solidFill>
+                  <a:srgbClr val="006600"/>
+                </a:solidFill>
                 <a:latin typeface="Arial"/>
               </a:rPr>
               <a:t>Rule</a:t>
             </a:r>
             <a:r>
               <a:rPr lang="en-GB" sz="1200">
+                <a:solidFill>
+                  <a:srgbClr val="006600"/>
+                </a:solidFill>
                 <a:latin typeface="Courier New"/>
               </a:rPr>
               <a:t>Request</a:t>
             </a:r>
             <a:r>
               <a:rPr lang="en-GB" sz="1200">
+                <a:solidFill>
+                  <a:srgbClr val="006600"/>
+                </a:solidFill>
                 <a:latin typeface="Arial"/>
               </a:rPr>
               <a:t>NotAuthorized</a:t>
@@ -3243,7 +3342,7 @@
         <p:spPr>
           <a:xfrm>
             <a:off x="216360" y="6192360"/>
-            <a:ext cx="1034280" cy="291600"/>
+            <a:ext cx="1034280" cy="294480"/>
           </a:xfrm>
           <a:prstGeom prst="rect">
             <a:avLst/>
@@ -3258,6 +3357,9 @@
           <a:p>
             <a:r>
               <a:rPr b="1" i="1" lang="en-GB" sz="1400">
+                <a:solidFill>
+                  <a:srgbClr val="808080"/>
+                </a:solidFill>
                 <a:latin typeface="Courier New"/>
               </a:rPr>
               <a:t>Legend: </a:t>
@@ -3339,7 +3441,7 @@
         <p:spPr>
           <a:xfrm>
             <a:off x="3356640" y="5564520"/>
-            <a:ext cx="1107360" cy="346320"/>
+            <a:ext cx="1113480" cy="346320"/>
           </a:xfrm>
           <a:prstGeom prst="rect">
             <a:avLst/>
@@ -3426,35 +3528,140 @@
           </a:p>
         </p:txBody>
       </p:sp>
+      <p:sp>
+        <p:nvSpPr>
+          <p:cNvPr id="102" name="TextShape 64"/>
+          <p:cNvSpPr txBox="1"/>
+          <p:nvPr/>
+        </p:nvSpPr>
+        <p:spPr>
+          <a:xfrm>
+            <a:off x="6120000" y="6264360"/>
+            <a:ext cx="3384000" cy="290160"/>
+          </a:xfrm>
+          <a:prstGeom prst="rect">
+            <a:avLst/>
+          </a:prstGeom>
+          <a:noFill/>
+          <a:ln>
+            <a:noFill/>
+          </a:ln>
+        </p:spPr>
+        <p:txBody>
+          <a:bodyPr lIns="90000" rIns="90000" tIns="45000" bIns="45000"/>
+          <a:p>
+            <a:r>
+              <a:rPr lang="en-GB" sz="1200">
+                <a:solidFill>
+                  <a:srgbClr val="006600"/>
+                </a:solidFill>
+                <a:latin typeface="Arial"/>
+              </a:rPr>
+              <a:t>MetaRule</a:t>
+            </a:r>
+            <a:r>
+              <a:rPr lang="en-GB" sz="1200">
+                <a:solidFill>
+                  <a:srgbClr val="006600"/>
+                </a:solidFill>
+                <a:latin typeface="Courier New"/>
+              </a:rPr>
+              <a:t>Request</a:t>
+            </a:r>
+            <a:r>
+              <a:rPr lang="en-GB" sz="1200">
+                <a:solidFill>
+                  <a:srgbClr val="006600"/>
+                </a:solidFill>
+                <a:latin typeface="Arial"/>
+              </a:rPr>
+              <a:t>NotAuthorized</a:t>
+            </a:r>
+            <a:endParaRPr/>
+          </a:p>
+        </p:txBody>
+      </p:sp>
+      <p:cxnSp>
+        <p:nvCxnSpPr>
+          <p:cNvPr id="103" name="Line 65"/>
+          <p:cNvCxnSpPr>
+            <a:endCxn id="102" idx="1"/>
+          </p:cNvCxnSpPr>
+          <p:nvPr/>
+        </p:nvCxnSpPr>
+        <p:spPr>
+          <a:xfrm>
+            <a:off x="4464000" y="6228360"/>
+            <a:ext cx="1656360" cy="181440"/>
+          </a:xfrm>
+          <a:prstGeom prst="straightConnector1">
+            <a:avLst/>
+          </a:prstGeom>
+          <a:ln>
+            <a:solidFill>
+              <a:srgbClr val="000000"/>
+            </a:solidFill>
+          </a:ln>
+        </p:spPr>
+      </p:cxnSp>
+      <p:sp>
+        <p:nvSpPr>
+          <p:cNvPr id="104" name="TextShape 66"/>
+          <p:cNvSpPr txBox="1"/>
+          <p:nvPr/>
+        </p:nvSpPr>
+        <p:spPr>
+          <a:xfrm>
+            <a:off x="3356640" y="6055200"/>
+            <a:ext cx="1107360" cy="346320"/>
+          </a:xfrm>
+          <a:prstGeom prst="rect">
+            <a:avLst/>
+          </a:prstGeom>
+          <a:noFill/>
+          <a:ln>
+            <a:noFill/>
+          </a:ln>
+        </p:spPr>
+        <p:txBody>
+          <a:bodyPr lIns="90000" rIns="90000" tIns="45000" bIns="45000"/>
+          <a:p>
+            <a:r>
+              <a:rPr lang="en-GB" sz="1400">
+                <a:latin typeface="Arial"/>
+              </a:rPr>
+              <a:t>MetaRule</a:t>
+            </a:r>
+            <a:endParaRPr/>
+          </a:p>
+        </p:txBody>
+      </p:sp>
+      <p:cxnSp>
+        <p:nvCxnSpPr>
+          <p:cNvPr id="105" name="Line 67"/>
+          <p:cNvCxnSpPr>
+            <a:stCxn id="42" idx="3"/>
+            <a:endCxn id="104" idx="1"/>
+          </p:cNvCxnSpPr>
+          <p:nvPr/>
+        </p:nvCxnSpPr>
+        <p:spPr>
+          <a:xfrm>
+            <a:off x="2800080" y="5285160"/>
+            <a:ext cx="556920" cy="943560"/>
+          </a:xfrm>
+          <a:prstGeom prst="straightConnector1">
+            <a:avLst/>
+          </a:prstGeom>
+          <a:ln>
+            <a:solidFill>
+              <a:srgbClr val="000000"/>
+            </a:solidFill>
+          </a:ln>
+        </p:spPr>
+      </p:cxnSp>
     </p:spTree>
   </p:cSld>
-  <p:timing>
-    <p:tnLst>
-      <p:par>
-        <p:cTn id="1" dur="indefinite" restart="never" nodeType="tmRoot">
-          <p:childTnLst>
-            <p:seq>
-              <p:cTn id="2" nodeType="mainSeq"/>
-              <p:prevCondLst>
-                <p:cond delay="0" evt="onPrev">
-                  <p:tgtEl>
-                    <p:sldTgt/>
-                  </p:tgtEl>
-                </p:cond>
-              </p:prevCondLst>
-              <p:nextCondLst>
-                <p:cond delay="0" evt="onNext">
-                  <p:tgtEl>
-                    <p:sldTgt/>
-                  </p:tgtEl>
-                </p:cond>
-              </p:nextCondLst>
-            </p:seq>
-          </p:childTnLst>
-        </p:cTn>
-      </p:par>
-    </p:tnLst>
-  </p:timing>
 </p:sld>
 </file>
 

</xml_diff>